<commit_message>
Added web app logo and edit some descriptions
</commit_message>
<xml_diff>
--- a/Team_Status_Oct.pptx
+++ b/Team_Status_Oct.pptx
@@ -104,6 +104,11 @@
       </a:defRPr>
     </a:lvl9pPr>
   </p:defaultTextStyle>
+  <p:extLst>
+    <p:ext uri="{EFAFB233-063F-42B5-8137-9DF3F51BA10A}">
+      <p15:sldGuideLst xmlns:p15="http://schemas.microsoft.com/office/powerpoint/2012/main"/>
+    </p:ext>
+  </p:extLst>
 </p:presentation>
 </file>
 
@@ -152,7 +157,6 @@
               <a:rPr lang="en-US"/>
               <a:t>Click to edit Master title style</a:t>
             </a:r>
-            <a:endParaRPr lang="en-US"/>
           </a:p>
         </p:txBody>
       </p:sp>
@@ -217,7 +221,6 @@
               <a:rPr lang="en-US"/>
               <a:t>Click to edit Master subtitle style</a:t>
             </a:r>
-            <a:endParaRPr lang="en-US"/>
           </a:p>
         </p:txBody>
       </p:sp>
@@ -238,7 +241,7 @@
           <a:p>
             <a:fld id="{0D0EFE70-D707-4585-992C-BBD480C62B7D}" type="datetimeFigureOut">
               <a:rPr lang="en-US" smtClean="0"/>
-              <a:t>10/19/2016</a:t>
+              <a:t>10/20/2016</a:t>
             </a:fld>
             <a:endParaRPr lang="en-US"/>
           </a:p>
@@ -335,7 +338,6 @@
               <a:rPr lang="en-US"/>
               <a:t>Click to edit Master title style</a:t>
             </a:r>
-            <a:endParaRPr lang="en-US"/>
           </a:p>
         </p:txBody>
       </p:sp>
@@ -387,7 +389,6 @@
               <a:rPr lang="en-US"/>
               <a:t>Fifth level</a:t>
             </a:r>
-            <a:endParaRPr lang="en-US"/>
           </a:p>
         </p:txBody>
       </p:sp>
@@ -408,7 +409,7 @@
           <a:p>
             <a:fld id="{0D0EFE70-D707-4585-992C-BBD480C62B7D}" type="datetimeFigureOut">
               <a:rPr lang="en-US" smtClean="0"/>
-              <a:t>10/19/2016</a:t>
+              <a:t>10/20/2016</a:t>
             </a:fld>
             <a:endParaRPr lang="en-US"/>
           </a:p>
@@ -510,7 +511,6 @@
               <a:rPr lang="en-US"/>
               <a:t>Click to edit Master title style</a:t>
             </a:r>
-            <a:endParaRPr lang="en-US"/>
           </a:p>
         </p:txBody>
       </p:sp>
@@ -567,7 +567,6 @@
               <a:rPr lang="en-US"/>
               <a:t>Fifth level</a:t>
             </a:r>
-            <a:endParaRPr lang="en-US"/>
           </a:p>
         </p:txBody>
       </p:sp>
@@ -588,7 +587,7 @@
           <a:p>
             <a:fld id="{0D0EFE70-D707-4585-992C-BBD480C62B7D}" type="datetimeFigureOut">
               <a:rPr lang="en-US" smtClean="0"/>
-              <a:t>10/19/2016</a:t>
+              <a:t>10/20/2016</a:t>
             </a:fld>
             <a:endParaRPr lang="en-US"/>
           </a:p>
@@ -685,7 +684,6 @@
               <a:rPr lang="en-US"/>
               <a:t>Click to edit Master title style</a:t>
             </a:r>
-            <a:endParaRPr lang="en-US"/>
           </a:p>
         </p:txBody>
       </p:sp>
@@ -737,7 +735,6 @@
               <a:rPr lang="en-US"/>
               <a:t>Fifth level</a:t>
             </a:r>
-            <a:endParaRPr lang="en-US"/>
           </a:p>
         </p:txBody>
       </p:sp>
@@ -758,7 +755,7 @@
           <a:p>
             <a:fld id="{0D0EFE70-D707-4585-992C-BBD480C62B7D}" type="datetimeFigureOut">
               <a:rPr lang="en-US" smtClean="0"/>
-              <a:t>10/19/2016</a:t>
+              <a:t>10/20/2016</a:t>
             </a:fld>
             <a:endParaRPr lang="en-US"/>
           </a:p>
@@ -864,7 +861,6 @@
               <a:rPr lang="en-US"/>
               <a:t>Click to edit Master title style</a:t>
             </a:r>
-            <a:endParaRPr lang="en-US"/>
           </a:p>
         </p:txBody>
       </p:sp>
@@ -1004,7 +1000,7 @@
           <a:p>
             <a:fld id="{0D0EFE70-D707-4585-992C-BBD480C62B7D}" type="datetimeFigureOut">
               <a:rPr lang="en-US" smtClean="0"/>
-              <a:t>10/19/2016</a:t>
+              <a:t>10/20/2016</a:t>
             </a:fld>
             <a:endParaRPr lang="en-US"/>
           </a:p>
@@ -1101,7 +1097,6 @@
               <a:rPr lang="en-US"/>
               <a:t>Click to edit Master title style</a:t>
             </a:r>
-            <a:endParaRPr lang="en-US"/>
           </a:p>
         </p:txBody>
       </p:sp>
@@ -1158,7 +1153,6 @@
               <a:rPr lang="en-US"/>
               <a:t>Fifth level</a:t>
             </a:r>
-            <a:endParaRPr lang="en-US"/>
           </a:p>
         </p:txBody>
       </p:sp>
@@ -1215,7 +1209,6 @@
               <a:rPr lang="en-US"/>
               <a:t>Fifth level</a:t>
             </a:r>
-            <a:endParaRPr lang="en-US"/>
           </a:p>
         </p:txBody>
       </p:sp>
@@ -1236,7 +1229,7 @@
           <a:p>
             <a:fld id="{0D0EFE70-D707-4585-992C-BBD480C62B7D}" type="datetimeFigureOut">
               <a:rPr lang="en-US" smtClean="0"/>
-              <a:t>10/19/2016</a:t>
+              <a:t>10/20/2016</a:t>
             </a:fld>
             <a:endParaRPr lang="en-US"/>
           </a:p>
@@ -1338,7 +1331,6 @@
               <a:rPr lang="en-US"/>
               <a:t>Click to edit Master title style</a:t>
             </a:r>
-            <a:endParaRPr lang="en-US"/>
           </a:p>
         </p:txBody>
       </p:sp>
@@ -1460,7 +1452,6 @@
               <a:rPr lang="en-US"/>
               <a:t>Fifth level</a:t>
             </a:r>
-            <a:endParaRPr lang="en-US"/>
           </a:p>
         </p:txBody>
       </p:sp>
@@ -1582,7 +1573,6 @@
               <a:rPr lang="en-US"/>
               <a:t>Fifth level</a:t>
             </a:r>
-            <a:endParaRPr lang="en-US"/>
           </a:p>
         </p:txBody>
       </p:sp>
@@ -1603,7 +1593,7 @@
           <a:p>
             <a:fld id="{0D0EFE70-D707-4585-992C-BBD480C62B7D}" type="datetimeFigureOut">
               <a:rPr lang="en-US" smtClean="0"/>
-              <a:t>10/19/2016</a:t>
+              <a:t>10/20/2016</a:t>
             </a:fld>
             <a:endParaRPr lang="en-US"/>
           </a:p>
@@ -1700,7 +1690,6 @@
               <a:rPr lang="en-US"/>
               <a:t>Click to edit Master title style</a:t>
             </a:r>
-            <a:endParaRPr lang="en-US"/>
           </a:p>
         </p:txBody>
       </p:sp>
@@ -1721,7 +1710,7 @@
           <a:p>
             <a:fld id="{0D0EFE70-D707-4585-992C-BBD480C62B7D}" type="datetimeFigureOut">
               <a:rPr lang="en-US" smtClean="0"/>
-              <a:t>10/19/2016</a:t>
+              <a:t>10/20/2016</a:t>
             </a:fld>
             <a:endParaRPr lang="en-US"/>
           </a:p>
@@ -1816,7 +1805,7 @@
           <a:p>
             <a:fld id="{0D0EFE70-D707-4585-992C-BBD480C62B7D}" type="datetimeFigureOut">
               <a:rPr lang="en-US" smtClean="0"/>
-              <a:t>10/19/2016</a:t>
+              <a:t>10/20/2016</a:t>
             </a:fld>
             <a:endParaRPr lang="en-US"/>
           </a:p>
@@ -1922,7 +1911,6 @@
               <a:rPr lang="en-US"/>
               <a:t>Click to edit Master title style</a:t>
             </a:r>
-            <a:endParaRPr lang="en-US"/>
           </a:p>
         </p:txBody>
       </p:sp>
@@ -2007,7 +1995,6 @@
               <a:rPr lang="en-US"/>
               <a:t>Fifth level</a:t>
             </a:r>
-            <a:endParaRPr lang="en-US"/>
           </a:p>
         </p:txBody>
       </p:sp>
@@ -2093,7 +2080,7 @@
           <a:p>
             <a:fld id="{0D0EFE70-D707-4585-992C-BBD480C62B7D}" type="datetimeFigureOut">
               <a:rPr lang="en-US" smtClean="0"/>
-              <a:t>10/19/2016</a:t>
+              <a:t>10/20/2016</a:t>
             </a:fld>
             <a:endParaRPr lang="en-US"/>
           </a:p>
@@ -2199,7 +2186,6 @@
               <a:rPr lang="en-US"/>
               <a:t>Click to edit Master title style</a:t>
             </a:r>
-            <a:endParaRPr lang="en-US"/>
           </a:p>
         </p:txBody>
       </p:sp>
@@ -2346,7 +2332,7 @@
           <a:p>
             <a:fld id="{0D0EFE70-D707-4585-992C-BBD480C62B7D}" type="datetimeFigureOut">
               <a:rPr lang="en-US" smtClean="0"/>
-              <a:t>10/19/2016</a:t>
+              <a:t>10/20/2016</a:t>
             </a:fld>
             <a:endParaRPr lang="en-US"/>
           </a:p>
@@ -2458,7 +2444,6 @@
               <a:rPr lang="en-US"/>
               <a:t>Click to edit Master title style</a:t>
             </a:r>
-            <a:endParaRPr lang="en-US"/>
           </a:p>
         </p:txBody>
       </p:sp>
@@ -2520,7 +2505,6 @@
               <a:rPr lang="en-US"/>
               <a:t>Fifth level</a:t>
             </a:r>
-            <a:endParaRPr lang="en-US"/>
           </a:p>
         </p:txBody>
       </p:sp>
@@ -2559,7 +2543,7 @@
           <a:p>
             <a:fld id="{0D0EFE70-D707-4585-992C-BBD480C62B7D}" type="datetimeFigureOut">
               <a:rPr lang="en-US" smtClean="0"/>
-              <a:t>10/19/2016</a:t>
+              <a:t>10/20/2016</a:t>
             </a:fld>
             <a:endParaRPr lang="en-US"/>
           </a:p>
@@ -2974,20 +2958,25 @@
             <p:ph type="title"/>
           </p:nvPr>
         </p:nvSpPr>
-        <p:spPr/>
-        <p:txBody>
-          <a:bodyPr/>
-          <a:lstStyle/>
-          <a:p>
-            <a:r>
-              <a:rPr lang="en-US" dirty="0"/>
+        <p:spPr>
+          <a:xfrm>
+            <a:off x="838200" y="66188"/>
+            <a:ext cx="10515600" cy="1164736"/>
+          </a:xfrm>
+        </p:spPr>
+        <p:txBody>
+          <a:bodyPr/>
+          <a:lstStyle/>
+          <a:p>
+            <a:r>
+              <a:rPr lang="en-US" b="1" dirty="0"/>
               <a:t>26 – Team </a:t>
             </a:r>
             <a:r>
-              <a:rPr lang="en-US" dirty="0" err="1"/>
+              <a:rPr lang="en-US" b="1" dirty="0" err="1"/>
               <a:t>Gibberfish</a:t>
             </a:r>
-            <a:endParaRPr lang="en-US" dirty="0"/>
+            <a:endParaRPr lang="en-US" b="1" dirty="0"/>
           </a:p>
         </p:txBody>
       </p:sp>
@@ -3001,7 +2990,12 @@
             <p:ph idx="1"/>
           </p:nvPr>
         </p:nvSpPr>
-        <p:spPr/>
+        <p:spPr>
+          <a:xfrm>
+            <a:off x="571500" y="1125416"/>
+            <a:ext cx="10782300" cy="5051548"/>
+          </a:xfrm>
+        </p:spPr>
         <p:txBody>
           <a:bodyPr>
             <a:normAutofit fontScale="85000" lnSpcReduction="20000"/>
@@ -3010,12 +3004,11 @@
           <a:p>
             <a:r>
               <a:rPr lang="en-US" dirty="0"/>
-              <a:t>Vision Statement: </a:t>
-            </a:r>
-            <a:r>
-              <a:rPr lang="en-US" dirty="0"/>
-              <a:t>Your number one fishing companion that provides a wealth of fishing resources, species guide, easy-to-use state and federal regulations to our fellow anglers, ichthyologists, and fish enthusiasts.</a:t>
-            </a:r>
+              <a:t>Vision Statement: Your number one fishing companion that provides a wealth of fishing resources, species guide, easy-to-use state and federal regulations to our fellow anglers, ichthyologists, and fish enthusiasts.</a:t>
+            </a:r>
+          </a:p>
+          <a:p>
+            <a:endParaRPr lang="en-US" sz="1600" dirty="0"/>
           </a:p>
           <a:p>
             <a:r>
@@ -3024,6 +3017,9 @@
             </a:r>
           </a:p>
           <a:p>
+            <a:endParaRPr lang="en-US" sz="1600" dirty="0"/>
+          </a:p>
+          <a:p>
             <a:r>
               <a:rPr lang="en-US" dirty="0"/>
               <a:t>Team Member – Focus</a:t>
@@ -3040,15 +3036,7 @@
             <a:pPr lvl="1"/>
             <a:r>
               <a:rPr lang="en-US" dirty="0"/>
-              <a:t>Nelson </a:t>
-            </a:r>
-            <a:r>
-              <a:rPr lang="en-US" dirty="0" err="1"/>
-              <a:t>Khor</a:t>
-            </a:r>
-            <a:r>
-              <a:rPr lang="en-US" dirty="0"/>
-              <a:t> – Database/Google Maps API</a:t>
+              <a:t>Nelson Khor – Backend/Google Maps API</a:t>
             </a:r>
           </a:p>
           <a:p>
@@ -3070,7 +3058,7 @@
             <a:pPr lvl="1"/>
             <a:r>
               <a:rPr lang="en-US" dirty="0"/>
-              <a:t>Josh McCann – Website/Writeups/General [idk if this is accurate]</a:t>
+              <a:t>Josh McCann – Website/Writeups/General</a:t>
             </a:r>
           </a:p>
           <a:p>
@@ -3085,6 +3073,69 @@
             <a:r>
               <a:rPr lang="en-US" dirty="0"/>
               <a:t>Eric Murphy - Database</a:t>
+            </a:r>
+          </a:p>
+        </p:txBody>
+      </p:sp>
+      <p:pic>
+        <p:nvPicPr>
+          <p:cNvPr id="4" name="Picture 3"/>
+          <p:cNvPicPr>
+            <a:picLocks noChangeAspect="1"/>
+          </p:cNvPicPr>
+          <p:nvPr/>
+        </p:nvPicPr>
+        <p:blipFill>
+          <a:blip r:embed="rId2">
+            <a:extLst>
+              <a:ext uri="{28A0092B-C50C-407E-A947-70E740481C1C}">
+                <a14:useLocalDpi xmlns:a14="http://schemas.microsoft.com/office/drawing/2010/main" val="0"/>
+              </a:ext>
+            </a:extLst>
+          </a:blip>
+          <a:stretch>
+            <a:fillRect/>
+          </a:stretch>
+        </p:blipFill>
+        <p:spPr>
+          <a:xfrm>
+            <a:off x="7570577" y="3306547"/>
+            <a:ext cx="4304900" cy="3074928"/>
+          </a:xfrm>
+          <a:prstGeom prst="rect">
+            <a:avLst/>
+          </a:prstGeom>
+        </p:spPr>
+      </p:pic>
+      <p:sp>
+        <p:nvSpPr>
+          <p:cNvPr id="5" name="TextBox 4"/>
+          <p:cNvSpPr txBox="1"/>
+          <p:nvPr/>
+        </p:nvSpPr>
+        <p:spPr>
+          <a:xfrm>
+            <a:off x="9069265" y="6094554"/>
+            <a:ext cx="1696916" cy="369332"/>
+          </a:xfrm>
+          <a:prstGeom prst="rect">
+            <a:avLst/>
+          </a:prstGeom>
+          <a:noFill/>
+        </p:spPr>
+        <p:txBody>
+          <a:bodyPr wrap="square" rtlCol="0">
+            <a:spAutoFit/>
+          </a:bodyPr>
+          <a:lstStyle/>
+          <a:p>
+            <a:r>
+              <a:rPr lang="en-US" dirty="0" err="1"/>
+              <a:t>Anglerpedia</a:t>
+            </a:r>
+            <a:r>
+              <a:rPr lang="en-US" dirty="0"/>
+              <a:t> </a:t>
             </a:r>
           </a:p>
         </p:txBody>

</xml_diff>